<commit_message>
Fix an error on Page 10
</commit_message>
<xml_diff>
--- a/week04/Lab04.pptx
+++ b/week04/Lab04.pptx
@@ -9331,7 +9331,7 @@
               <a:defRPr/>
             </a:pPr>
             <a:r>
-              <a:rPr kumimoji="0" lang="en-US" sz="2540" b="1" i="0" u="none" strike="noStrike" kern="1200" cap="none" spc="0" normalizeH="0" baseline="0" noProof="0" dirty="0">
+              <a:rPr kumimoji="0" lang="en-US" sz="2540" b="1" i="0" u="none" strike="noStrike" kern="1200" cap="none" spc="0" normalizeH="0" baseline="0" noProof="0">
                 <a:ln>
                   <a:noFill/>
                 </a:ln>
@@ -9348,6 +9348,23 @@
               <a:t>$@</a:t>
             </a:r>
             <a:r>
+              <a:rPr kumimoji="0" lang="en-US" sz="2540" b="0" i="0" u="none" strike="noStrike" kern="1200" cap="none" spc="0" normalizeH="0" baseline="0" noProof="0">
+                <a:ln>
+                  <a:noFill/>
+                </a:ln>
+                <a:solidFill>
+                  <a:prstClr val="black"/>
+                </a:solidFill>
+                <a:effectLst/>
+                <a:uLnTx/>
+                <a:uFillTx/>
+                <a:latin typeface="Calibri" panose="020F0502020204030204"/>
+                <a:ea typeface="+mn-ea"/>
+                <a:cs typeface="+mn-cs"/>
+              </a:rPr>
+              <a:t>: the target </a:t>
+            </a:r>
+            <a:r>
               <a:rPr kumimoji="0" lang="en-US" sz="2540" b="0" i="0" u="none" strike="noStrike" kern="1200" cap="none" spc="0" normalizeH="0" baseline="0" noProof="0" dirty="0">
                 <a:ln>
                   <a:noFill/>
@@ -9362,7 +9379,7 @@
                 <a:ea typeface="+mn-ea"/>
                 <a:cs typeface="+mn-cs"/>
               </a:rPr>
-              <a:t>: Object Files</a:t>
+              <a:t>file</a:t>
             </a:r>
           </a:p>
           <a:p>

</xml_diff>